<commit_message>
Iteration 1 - Sumbission
</commit_message>
<xml_diff>
--- a/cv2023.pptx
+++ b/cv2023.pptx
@@ -12056,13 +12056,13 @@
           <p:nvPr>
             <p:extLst>
               <p:ext uri="{D42A27DB-BD31-4B8C-83A1-F6EECF244321}">
-                <p14:modId xmlns:p14="http://schemas.microsoft.com/office/powerpoint/2010/main" val="269079190"/>
+                <p14:modId xmlns:p14="http://schemas.microsoft.com/office/powerpoint/2010/main" val="2023672439"/>
               </p:ext>
             </p:extLst>
           </p:nvPr>
         </p:nvGraphicFramePr>
         <p:xfrm>
-          <a:off x="194727" y="4910674"/>
+          <a:off x="194727" y="4978410"/>
           <a:ext cx="12513735" cy="414867"/>
         </p:xfrm>
         <a:graphic>
@@ -12085,7 +12085,7 @@
         </p:nvGrpSpPr>
         <p:grpSpPr>
           <a:xfrm>
-            <a:off x="169332" y="7579860"/>
+            <a:off x="169332" y="7715332"/>
             <a:ext cx="12513735" cy="1126067"/>
             <a:chOff x="287864" y="4783435"/>
             <a:chExt cx="12513735" cy="1126067"/>
@@ -12532,13 +12532,6 @@
             </a:endParaRPr>
           </a:p>
           <a:p>
-            <a:endParaRPr lang="en-US" sz="800" dirty="0">
-              <a:solidFill>
-                <a:schemeClr val="tx1"/>
-              </a:solidFill>
-            </a:endParaRPr>
-          </a:p>
-          <a:p>
             <a:pPr marL="171450" indent="-171450">
               <a:buFont typeface="Arial" panose="020B0604020202020204" pitchFamily="34" charset="0"/>
               <a:buChar char="•"/>
@@ -12607,6 +12600,13 @@
               </a:rPr>
               <a:t>Created various Solution and microservice designs for AI based data matching, water meter readings and leakage detection</a:t>
             </a:r>
+          </a:p>
+          <a:p>
+            <a:endParaRPr lang="en-US" sz="800" dirty="0">
+              <a:solidFill>
+                <a:schemeClr val="tx1"/>
+              </a:solidFill>
+            </a:endParaRPr>
           </a:p>
           <a:p>
             <a:endParaRPr lang="en-US" sz="800" dirty="0">
@@ -12817,20 +12817,6 @@
             </a:endParaRPr>
           </a:p>
           <a:p>
-            <a:endParaRPr lang="en-US" sz="800" dirty="0">
-              <a:solidFill>
-                <a:schemeClr val="tx1"/>
-              </a:solidFill>
-            </a:endParaRPr>
-          </a:p>
-          <a:p>
-            <a:endParaRPr lang="en-US" sz="800" dirty="0">
-              <a:solidFill>
-                <a:schemeClr val="tx1"/>
-              </a:solidFill>
-            </a:endParaRPr>
-          </a:p>
-          <a:p>
             <a:pPr marL="171450" indent="-171450">
               <a:buFont typeface="Arial" panose="020B0604020202020204" pitchFamily="34" charset="0"/>
               <a:buChar char="•"/>
@@ -12899,6 +12885,28 @@
               </a:rPr>
               <a:t>Trialed the use of ArchiMate notation for Solution Architecture</a:t>
             </a:r>
+          </a:p>
+          <a:p>
+            <a:pPr marL="171450" indent="-171450">
+              <a:buFont typeface="Arial" panose="020B0604020202020204" pitchFamily="34" charset="0"/>
+              <a:buChar char="•"/>
+            </a:pPr>
+            <a:endParaRPr lang="en-US" sz="800" dirty="0">
+              <a:solidFill>
+                <a:schemeClr val="tx1"/>
+              </a:solidFill>
+            </a:endParaRPr>
+          </a:p>
+          <a:p>
+            <a:pPr marL="171450" indent="-171450">
+              <a:buFont typeface="Arial" panose="020B0604020202020204" pitchFamily="34" charset="0"/>
+              <a:buChar char="•"/>
+            </a:pPr>
+            <a:endParaRPr lang="en-US" sz="800" dirty="0">
+              <a:solidFill>
+                <a:schemeClr val="tx1"/>
+              </a:solidFill>
+            </a:endParaRPr>
           </a:p>
           <a:p>
             <a:pPr marL="171450" indent="-171450">
@@ -13423,13 +13431,6 @@
             </a:endParaRPr>
           </a:p>
           <a:p>
-            <a:endParaRPr lang="en-US" sz="800" dirty="0">
-              <a:solidFill>
-                <a:schemeClr val="tx1"/>
-              </a:solidFill>
-            </a:endParaRPr>
-          </a:p>
-          <a:p>
             <a:pPr marL="171450" indent="-171450">
               <a:buFont typeface="Arial" panose="020B0604020202020204" pitchFamily="34" charset="0"/>
               <a:buChar char="•"/>
@@ -13470,6 +13471,17 @@
               </a:rPr>
               <a:t>Created High-Level Solution Design for new Insurance Product website, including mapping to and estimations for AEM standard and custom components and helped with costings for total project</a:t>
             </a:r>
+          </a:p>
+          <a:p>
+            <a:pPr marL="171450" indent="-171450">
+              <a:buFont typeface="Arial" panose="020B0604020202020204" pitchFamily="34" charset="0"/>
+              <a:buChar char="•"/>
+            </a:pPr>
+            <a:endParaRPr lang="en-US" sz="800" dirty="0">
+              <a:solidFill>
+                <a:schemeClr val="tx1"/>
+              </a:solidFill>
+            </a:endParaRPr>
           </a:p>
           <a:p>
             <a:pPr marL="171450" indent="-171450">
@@ -14066,7 +14078,7 @@
         </p:nvSpPr>
         <p:spPr>
           <a:xfrm>
-            <a:off x="194726" y="5325542"/>
+            <a:off x="194726" y="5393278"/>
             <a:ext cx="12513735" cy="369332"/>
           </a:xfrm>
           <a:prstGeom prst="rightArrow">
@@ -14139,7 +14151,7 @@
         </p:nvSpPr>
         <p:spPr>
           <a:xfrm>
-            <a:off x="4472558" y="5325541"/>
+            <a:off x="4472558" y="5393277"/>
             <a:ext cx="1764695" cy="374136"/>
           </a:xfrm>
           <a:prstGeom prst="rect">
@@ -14212,7 +14224,7 @@
         </p:nvSpPr>
         <p:spPr>
           <a:xfrm>
-            <a:off x="6589226" y="5330804"/>
+            <a:off x="6589226" y="5398540"/>
             <a:ext cx="1755173" cy="374136"/>
           </a:xfrm>
           <a:prstGeom prst="rect">
@@ -14285,7 +14297,7 @@
         </p:nvSpPr>
         <p:spPr>
           <a:xfrm>
-            <a:off x="8616897" y="5330804"/>
+            <a:off x="8616897" y="5398540"/>
             <a:ext cx="1753830" cy="374136"/>
           </a:xfrm>
           <a:prstGeom prst="rect">
@@ -14366,7 +14378,7 @@
         </p:nvSpPr>
         <p:spPr>
           <a:xfrm>
-            <a:off x="10718794" y="5323141"/>
+            <a:off x="10718794" y="5390877"/>
             <a:ext cx="1753829" cy="374136"/>
           </a:xfrm>
           <a:prstGeom prst="rect">
@@ -14439,7 +14451,7 @@
         </p:nvSpPr>
         <p:spPr>
           <a:xfrm>
-            <a:off x="2316570" y="5323141"/>
+            <a:off x="2316570" y="5390877"/>
             <a:ext cx="1791629" cy="374136"/>
           </a:xfrm>
           <a:prstGeom prst="rect">
@@ -14512,7 +14524,7 @@
         </p:nvSpPr>
         <p:spPr>
           <a:xfrm>
-            <a:off x="198953" y="5330804"/>
+            <a:off x="198953" y="5398540"/>
             <a:ext cx="1781812" cy="374136"/>
           </a:xfrm>
           <a:prstGeom prst="rect">
@@ -14620,7 +14632,7 @@
         </p:nvSpPr>
         <p:spPr>
           <a:xfrm>
-            <a:off x="10718796" y="5690533"/>
+            <a:off x="10718796" y="5758269"/>
             <a:ext cx="1764697" cy="1548000"/>
           </a:xfrm>
           <a:prstGeom prst="rect">
@@ -14663,8 +14675,80 @@
                   <a:schemeClr val="tx1"/>
                 </a:solidFill>
               </a:rPr>
-              <a:t>Consult internally and externally for OutSystems and Integration Architectures for Vodafone and ATO.</a:t>
-            </a:r>
+              <a:t>DB Results are a small Australian consultancy firm.</a:t>
+            </a:r>
+          </a:p>
+          <a:p>
+            <a:endParaRPr lang="en-US" sz="800" dirty="0">
+              <a:solidFill>
+                <a:schemeClr val="tx1"/>
+              </a:solidFill>
+            </a:endParaRPr>
+          </a:p>
+          <a:p>
+            <a:endParaRPr lang="en-US" sz="800" dirty="0">
+              <a:solidFill>
+                <a:schemeClr val="tx1"/>
+              </a:solidFill>
+            </a:endParaRPr>
+          </a:p>
+          <a:p>
+            <a:endParaRPr lang="en-US" sz="800" dirty="0">
+              <a:solidFill>
+                <a:schemeClr val="tx1"/>
+              </a:solidFill>
+            </a:endParaRPr>
+          </a:p>
+          <a:p>
+            <a:endParaRPr lang="en-US" sz="800" dirty="0">
+              <a:solidFill>
+                <a:schemeClr val="tx1"/>
+              </a:solidFill>
+            </a:endParaRPr>
+          </a:p>
+          <a:p>
+            <a:r>
+              <a:rPr lang="en-US" sz="800" dirty="0">
+                <a:solidFill>
+                  <a:schemeClr val="tx1"/>
+                </a:solidFill>
+              </a:rPr>
+              <a:t>Architected Business Self Service Portal for ATO deployed on AWS</a:t>
+            </a:r>
+          </a:p>
+          <a:p>
+            <a:r>
+              <a:rPr lang="en-US" sz="800" dirty="0">
+                <a:solidFill>
+                  <a:schemeClr val="tx1"/>
+                </a:solidFill>
+              </a:rPr>
+              <a:t>Developed  Integration Strategy for Vodafone.</a:t>
+            </a:r>
+          </a:p>
+          <a:p>
+            <a:r>
+              <a:rPr lang="en-US" sz="800" dirty="0">
+                <a:solidFill>
+                  <a:schemeClr val="tx1"/>
+                </a:solidFill>
+              </a:rPr>
+              <a:t>Refined Agile methodology and Solution Architecture approach</a:t>
+            </a:r>
+          </a:p>
+          <a:p>
+            <a:endParaRPr lang="en-US" sz="800" dirty="0">
+              <a:solidFill>
+                <a:schemeClr val="tx1"/>
+              </a:solidFill>
+            </a:endParaRPr>
+          </a:p>
+          <a:p>
+            <a:endParaRPr lang="en-US" sz="800" dirty="0">
+              <a:solidFill>
+                <a:schemeClr val="tx1"/>
+              </a:solidFill>
+            </a:endParaRPr>
           </a:p>
         </p:txBody>
       </p:sp>
@@ -14682,7 +14766,7 @@
         </p:nvSpPr>
         <p:spPr>
           <a:xfrm>
-            <a:off x="8602132" y="5690533"/>
+            <a:off x="8602132" y="5758269"/>
             <a:ext cx="1764696" cy="1548000"/>
           </a:xfrm>
           <a:prstGeom prst="rect">
@@ -14736,13 +14820,27 @@
             </a:endParaRPr>
           </a:p>
           <a:p>
+            <a:endParaRPr lang="en-US" sz="800" dirty="0">
+              <a:solidFill>
+                <a:schemeClr val="tx1"/>
+              </a:solidFill>
+            </a:endParaRPr>
+          </a:p>
+          <a:p>
+            <a:endParaRPr lang="en-US" sz="800" dirty="0">
+              <a:solidFill>
+                <a:schemeClr val="tx1"/>
+              </a:solidFill>
+            </a:endParaRPr>
+          </a:p>
+          <a:p>
             <a:r>
               <a:rPr lang="en-US" sz="800" dirty="0">
                 <a:solidFill>
                   <a:schemeClr val="tx1"/>
                 </a:solidFill>
               </a:rPr>
-              <a:t>Create 5 year Enterprise Roadmap for Health Education England</a:t>
+              <a:t>Create 5 year Enterprise Roadmap for Health Education England using a Scrumban process which we then trained HEE staff in by co-creation and involvement in its iteration.</a:t>
             </a:r>
           </a:p>
           <a:p>
@@ -14789,7 +14887,7 @@
         </p:nvSpPr>
         <p:spPr>
           <a:xfrm>
-            <a:off x="6578596" y="5693513"/>
+            <a:off x="6578596" y="5761249"/>
             <a:ext cx="1764695" cy="1548000"/>
           </a:xfrm>
           <a:prstGeom prst="rect">
@@ -14843,21 +14941,28 @@
             </a:endParaRPr>
           </a:p>
           <a:p>
+            <a:endParaRPr lang="en-US" sz="800" dirty="0">
+              <a:solidFill>
+                <a:schemeClr val="tx1"/>
+              </a:solidFill>
+            </a:endParaRPr>
+          </a:p>
+          <a:p>
+            <a:endParaRPr lang="en-US" sz="800" dirty="0">
+              <a:solidFill>
+                <a:schemeClr val="tx1"/>
+              </a:solidFill>
+            </a:endParaRPr>
+          </a:p>
+          <a:p>
             <a:r>
               <a:rPr lang="en-US" sz="800" dirty="0">
                 <a:solidFill>
                   <a:schemeClr val="tx1"/>
                 </a:solidFill>
               </a:rPr>
-              <a:t>Create Baseline Digital Architecture for Thames Water’s Transformation</a:t>
-            </a:r>
-          </a:p>
-          <a:p>
-            <a:endParaRPr lang="en-US" sz="800" dirty="0">
-              <a:solidFill>
-                <a:schemeClr val="tx1"/>
-              </a:solidFill>
-            </a:endParaRPr>
+              <a:t>Create Baseline Digital Architecture for Thames Water’s Transformation including Reference Solution and Technical Architectures using SiteCore and Ionic on Private Cloud, AWS and Azure.</a:t>
+            </a:r>
           </a:p>
           <a:p>
             <a:endParaRPr lang="en-US" sz="800" dirty="0">
@@ -14896,7 +15001,7 @@
         </p:nvSpPr>
         <p:spPr>
           <a:xfrm>
-            <a:off x="4489493" y="5687331"/>
+            <a:off x="4489493" y="5755067"/>
             <a:ext cx="1740549" cy="1548000"/>
           </a:xfrm>
           <a:prstGeom prst="rect">
@@ -14949,7 +15054,7 @@
                   <a:schemeClr val="tx1"/>
                 </a:solidFill>
               </a:rPr>
-              <a:t>to create the “bus” for Smart Metering infrastructure between the consumer and suppliers</a:t>
+              <a:t>to create the “bus” for Smart Metering infrastructure between the consumer and suppliers.</a:t>
             </a:r>
           </a:p>
           <a:p>
@@ -14999,7 +15104,7 @@
         </p:nvSpPr>
         <p:spPr>
           <a:xfrm>
-            <a:off x="2311394" y="5687329"/>
+            <a:off x="2311394" y="5755065"/>
             <a:ext cx="1796805" cy="1548000"/>
           </a:xfrm>
           <a:prstGeom prst="rect">
@@ -15042,8 +15147,22 @@
                   <a:schemeClr val="tx1"/>
                 </a:solidFill>
               </a:rPr>
-              <a:t>Part of Boston-based State Street Corporation, the world’s leading provider of services to institutional investors</a:t>
-            </a:r>
+              <a:t>Part of Boston-based State Street Corporation, the world’s leading provider of services to institutional investors.</a:t>
+            </a:r>
+          </a:p>
+          <a:p>
+            <a:endParaRPr lang="en-US" sz="800" dirty="0">
+              <a:solidFill>
+                <a:schemeClr val="tx1"/>
+              </a:solidFill>
+            </a:endParaRPr>
+          </a:p>
+          <a:p>
+            <a:endParaRPr lang="en-US" sz="800" dirty="0">
+              <a:solidFill>
+                <a:schemeClr val="tx1"/>
+              </a:solidFill>
+            </a:endParaRPr>
           </a:p>
           <a:p>
             <a:r>
@@ -15052,7 +15171,7 @@
                   <a:schemeClr val="tx1"/>
                 </a:solidFill>
               </a:rPr>
-              <a:t>Implement a new Service Oriented Architecture and perform SOA Migration to WebMethods</a:t>
+              <a:t>Architect, Manage and Implement a new Service Oriented Architecture and perform SOA Migration to WebMethods.</a:t>
             </a:r>
           </a:p>
           <a:p>
@@ -15078,7 +15197,7 @@
         </p:nvSpPr>
         <p:spPr>
           <a:xfrm>
-            <a:off x="194726" y="5687329"/>
+            <a:off x="194726" y="5755065"/>
             <a:ext cx="1780501" cy="1548000"/>
           </a:xfrm>
           <a:prstGeom prst="rect">
@@ -15122,6 +15241,52 @@
                 </a:solidFill>
               </a:rPr>
               <a:t>Global Core Insurance solutions, including the London Insurance Market at Lloyd’s of London.</a:t>
+            </a:r>
+          </a:p>
+          <a:p>
+            <a:endParaRPr lang="en-US" sz="800" dirty="0">
+              <a:solidFill>
+                <a:schemeClr val="tx1"/>
+              </a:solidFill>
+            </a:endParaRPr>
+          </a:p>
+          <a:p>
+            <a:endParaRPr lang="en-US" sz="800" dirty="0">
+              <a:solidFill>
+                <a:schemeClr val="tx1"/>
+              </a:solidFill>
+            </a:endParaRPr>
+          </a:p>
+          <a:p>
+            <a:endParaRPr lang="en-US" sz="800" dirty="0">
+              <a:solidFill>
+                <a:schemeClr val="tx1"/>
+              </a:solidFill>
+            </a:endParaRPr>
+          </a:p>
+          <a:p>
+            <a:r>
+              <a:rPr lang="en-US" sz="800" dirty="0">
+                <a:solidFill>
+                  <a:schemeClr val="tx1"/>
+                </a:solidFill>
+              </a:rPr>
+              <a:t>Create Solution Architectures for Xchanging’s new programmes, including an iPad application (X-presso) for Insurance Brokers in the London Insurance Market.</a:t>
+            </a:r>
+            <a:br>
+              <a:rPr lang="en-US" sz="800" dirty="0">
+                <a:solidFill>
+                  <a:schemeClr val="tx1"/>
+                </a:solidFill>
+              </a:rPr>
+            </a:br>
+            <a:r>
+              <a:rPr lang="en-US" sz="800" dirty="0">
+                <a:solidFill>
+                  <a:schemeClr val="tx1"/>
+                </a:solidFill>
+              </a:rPr>
+              <a:t>Helped develop Claims State Model.</a:t>
             </a:r>
           </a:p>
         </p:txBody>
@@ -15577,7 +15742,7 @@
         </p:blipFill>
         <p:spPr>
           <a:xfrm>
-            <a:off x="98005" y="5325200"/>
+            <a:off x="98005" y="5392936"/>
             <a:ext cx="369234" cy="337425"/>
           </a:xfrm>
           <a:prstGeom prst="rect">
@@ -15599,7 +15764,7 @@
         </p:nvSpPr>
         <p:spPr>
           <a:xfrm>
-            <a:off x="12075" y="5063984"/>
+            <a:off x="12075" y="5131720"/>
             <a:ext cx="550151" cy="307777"/>
           </a:xfrm>
           <a:prstGeom prst="rect">
@@ -15653,7 +15818,7 @@
         </p:blipFill>
         <p:spPr>
           <a:xfrm>
-            <a:off x="2277541" y="5341622"/>
+            <a:off x="2277541" y="5409358"/>
             <a:ext cx="335643" cy="335643"/>
           </a:xfrm>
           <a:prstGeom prst="rect">
@@ -15675,7 +15840,7 @@
         </p:nvSpPr>
         <p:spPr>
           <a:xfrm>
-            <a:off x="1843842" y="5350250"/>
+            <a:off x="1843842" y="5417986"/>
             <a:ext cx="550151" cy="307777"/>
           </a:xfrm>
           <a:prstGeom prst="rect">
@@ -15729,7 +15894,7 @@
         </p:blipFill>
         <p:spPr>
           <a:xfrm>
-            <a:off x="4422716" y="5340748"/>
+            <a:off x="4422716" y="5408484"/>
             <a:ext cx="368882" cy="354126"/>
           </a:xfrm>
           <a:prstGeom prst="rect">
@@ -15751,7 +15916,7 @@
         </p:nvSpPr>
         <p:spPr>
           <a:xfrm>
-            <a:off x="4001836" y="5336466"/>
+            <a:off x="4001836" y="5404202"/>
             <a:ext cx="550151" cy="307777"/>
           </a:xfrm>
           <a:prstGeom prst="rect">
@@ -15787,7 +15952,7 @@
         </p:nvGrpSpPr>
         <p:grpSpPr>
           <a:xfrm>
-            <a:off x="6520578" y="5324642"/>
+            <a:off x="6520578" y="5392378"/>
             <a:ext cx="353605" cy="356504"/>
             <a:chOff x="2787695" y="5189470"/>
             <a:chExt cx="3098800" cy="3124200"/>
@@ -15901,7 +16066,7 @@
         </p:nvSpPr>
         <p:spPr>
           <a:xfrm>
-            <a:off x="6138328" y="5350946"/>
+            <a:off x="6138328" y="5418682"/>
             <a:ext cx="550151" cy="307777"/>
           </a:xfrm>
           <a:prstGeom prst="rect">
@@ -15944,7 +16109,7 @@
         </p:blipFill>
         <p:spPr>
           <a:xfrm>
-            <a:off x="8556673" y="5420001"/>
+            <a:off x="8556673" y="5487737"/>
             <a:ext cx="471126" cy="183216"/>
           </a:xfrm>
           <a:prstGeom prst="rect">
@@ -15966,7 +16131,7 @@
         </p:nvSpPr>
         <p:spPr>
           <a:xfrm>
-            <a:off x="8195727" y="5350947"/>
+            <a:off x="8195727" y="5418683"/>
             <a:ext cx="550151" cy="307777"/>
           </a:xfrm>
           <a:prstGeom prst="rect">
@@ -16016,7 +16181,7 @@
         </p:blipFill>
         <p:spPr bwMode="auto">
           <a:xfrm>
-            <a:off x="10473453" y="5266986"/>
+            <a:off x="10473453" y="5334722"/>
             <a:ext cx="550152" cy="401812"/>
           </a:xfrm>
           <a:prstGeom prst="rect">
@@ -16048,7 +16213,7 @@
         </p:nvSpPr>
         <p:spPr>
           <a:xfrm>
-            <a:off x="70829" y="7359383"/>
+            <a:off x="70829" y="7494855"/>
             <a:ext cx="1138325" cy="307777"/>
           </a:xfrm>
           <a:prstGeom prst="rect">
@@ -16264,6 +16429,61 @@
           </p:spPr>
         </p:pic>
       </p:grpSp>
+      <p:sp>
+        <p:nvSpPr>
+          <p:cNvPr id="12" name="TextBox 11">
+            <a:extLst>
+              <a:ext uri="{FF2B5EF4-FFF2-40B4-BE49-F238E27FC236}">
+                <a16:creationId xmlns:a16="http://schemas.microsoft.com/office/drawing/2014/main" id="{BCCF78B8-A011-233C-97C8-D09FA7A0F415}"/>
+              </a:ext>
+            </a:extLst>
+          </p:cNvPr>
+          <p:cNvSpPr txBox="1"/>
+          <p:nvPr/>
+        </p:nvSpPr>
+        <p:spPr>
+          <a:xfrm>
+            <a:off x="168577" y="9158912"/>
+            <a:ext cx="11063221" cy="307777"/>
+          </a:xfrm>
+          <a:prstGeom prst="rect">
+            <a:avLst/>
+          </a:prstGeom>
+          <a:noFill/>
+        </p:spPr>
+        <p:txBody>
+          <a:bodyPr wrap="none" rtlCol="0">
+            <a:spAutoFit/>
+          </a:bodyPr>
+          <a:lstStyle/>
+          <a:p>
+            <a:r>
+              <a:rPr lang="en-US" sz="1400" dirty="0"/>
+              <a:t>All files and sources hosted in Git: </a:t>
+            </a:r>
+            <a:r>
+              <a:rPr lang="en-US" sz="1400" dirty="0">
+                <a:hlinkClick r:id="rId28"/>
+              </a:rPr>
+              <a:t>https://github.com/RiczWest/cv</a:t>
+            </a:r>
+            <a:r>
+              <a:rPr lang="en-US" sz="1400" dirty="0"/>
+              <a:t> – check here for latest version as I’m doing this iteratively and will update more </a:t>
+            </a:r>
+            <a:r>
+              <a:rPr lang="en-US" sz="1400" dirty="0">
+                <a:sym typeface="Wingdings" pitchFamily="2" charset="2"/>
+              </a:rPr>
+              <a:t>🙂</a:t>
+            </a:r>
+            <a:r>
+              <a:rPr lang="en-US" sz="1400" dirty="0"/>
+              <a:t> </a:t>
+            </a:r>
+          </a:p>
+        </p:txBody>
+      </p:sp>
     </p:spTree>
     <p:extLst>
       <p:ext uri="{BB962C8B-B14F-4D97-AF65-F5344CB8AC3E}">

</xml_diff>

<commit_message>
Iteration 1 - Submission
</commit_message>
<xml_diff>
--- a/cv2023.pptx
+++ b/cv2023.pptx
@@ -16469,7 +16469,17 @@
             </a:r>
             <a:r>
               <a:rPr lang="en-US" sz="1400" dirty="0"/>
-              <a:t> – check here for latest version as I’m doing this iteratively and will update more </a:t>
+              <a:t> – check here for </a:t>
+            </a:r>
+            <a:r>
+              <a:rPr lang="en-US" sz="1400" dirty="0">
+                <a:hlinkClick r:id="rId29"/>
+              </a:rPr>
+              <a:t>latest version</a:t>
+            </a:r>
+            <a:r>
+              <a:rPr lang="en-US" sz="1400" dirty="0"/>
+              <a:t> as I’m doing this iteratively and will update more </a:t>
             </a:r>
             <a:r>
               <a:rPr lang="en-US" sz="1400" dirty="0">

</xml_diff>

<commit_message>
Iteration 1 - sumbmission
</commit_message>
<xml_diff>
--- a/cv2023.pptx
+++ b/cv2023.pptx
@@ -16469,17 +16469,17 @@
             </a:r>
             <a:r>
               <a:rPr lang="en-US" sz="1400" dirty="0"/>
-              <a:t> – check here for </a:t>
+              <a:t> – </a:t>
             </a:r>
             <a:r>
               <a:rPr lang="en-US" sz="1400" dirty="0">
                 <a:hlinkClick r:id="rId29"/>
               </a:rPr>
-              <a:t>latest version</a:t>
+              <a:t>check here for latest version </a:t>
             </a:r>
             <a:r>
               <a:rPr lang="en-US" sz="1400" dirty="0"/>
-              <a:t> as I’m doing this iteratively and will update more </a:t>
+              <a:t>as I’m doing this iteratively and will update more </a:t>
             </a:r>
             <a:r>
               <a:rPr lang="en-US" sz="1400" dirty="0">

</xml_diff>